<commit_message>
transformers: Add crop area support to pptx
ENG-460
</commit_message>
<xml_diff>
--- a/tests/data/test.pptx
+++ b/tests/data/test.pptx
@@ -8,6 +8,7 @@
     <p:sldId id="256" r:id="rId2"/>
     <p:sldId id="257" r:id="rId3"/>
     <p:sldId id="258" r:id="rId4"/>
+    <p:sldId id="259" r:id="rId5"/>
   </p:sldIdLst>
   <p:sldSz cx="12192000" cy="6858000"/>
   <p:notesSz cx="6858000" cy="9144000"/>
@@ -106,6 +107,11 @@
       </a:defRPr>
     </a:lvl9pPr>
   </p:defaultTextStyle>
+  <p:extLst>
+    <p:ext uri="{EFAFB233-063F-42B5-8137-9DF3F51BA10A}">
+      <p15:sldGuideLst xmlns:p15="http://schemas.microsoft.com/office/powerpoint/2012/main"/>
+    </p:ext>
+  </p:extLst>
 </p:presentation>
 </file>
 
@@ -272,7 +278,7 @@
           <a:p>
             <a:fld id="{E1E2DB06-679F-6849-ACCE-30C48984CE63}" type="datetimeFigureOut">
               <a:rPr lang="es-PY" smtClean="0"/>
-              <a:t>23/12/21</a:t>
+              <a:t>13/1/22</a:t>
             </a:fld>
             <a:endParaRPr lang="es-PY"/>
           </a:p>
@@ -442,7 +448,7 @@
           <a:p>
             <a:fld id="{E1E2DB06-679F-6849-ACCE-30C48984CE63}" type="datetimeFigureOut">
               <a:rPr lang="es-PY" smtClean="0"/>
-              <a:t>23/12/21</a:t>
+              <a:t>13/1/22</a:t>
             </a:fld>
             <a:endParaRPr lang="es-PY"/>
           </a:p>
@@ -622,7 +628,7 @@
           <a:p>
             <a:fld id="{E1E2DB06-679F-6849-ACCE-30C48984CE63}" type="datetimeFigureOut">
               <a:rPr lang="es-PY" smtClean="0"/>
-              <a:t>23/12/21</a:t>
+              <a:t>13/1/22</a:t>
             </a:fld>
             <a:endParaRPr lang="es-PY"/>
           </a:p>
@@ -792,7 +798,7 @@
           <a:p>
             <a:fld id="{E1E2DB06-679F-6849-ACCE-30C48984CE63}" type="datetimeFigureOut">
               <a:rPr lang="es-PY" smtClean="0"/>
-              <a:t>23/12/21</a:t>
+              <a:t>13/1/22</a:t>
             </a:fld>
             <a:endParaRPr lang="es-PY"/>
           </a:p>
@@ -1060,7 +1066,7 @@
           <a:p>
             <a:fld id="{E1E2DB06-679F-6849-ACCE-30C48984CE63}" type="datetimeFigureOut">
               <a:rPr lang="es-PY" smtClean="0"/>
-              <a:t>23/12/21</a:t>
+              <a:t>13/1/22</a:t>
             </a:fld>
             <a:endParaRPr lang="es-PY"/>
           </a:p>
@@ -1292,7 +1298,7 @@
           <a:p>
             <a:fld id="{E1E2DB06-679F-6849-ACCE-30C48984CE63}" type="datetimeFigureOut">
               <a:rPr lang="es-PY" smtClean="0"/>
-              <a:t>23/12/21</a:t>
+              <a:t>13/1/22</a:t>
             </a:fld>
             <a:endParaRPr lang="es-PY"/>
           </a:p>
@@ -1651,7 +1657,7 @@
           <a:p>
             <a:fld id="{E1E2DB06-679F-6849-ACCE-30C48984CE63}" type="datetimeFigureOut">
               <a:rPr lang="es-PY" smtClean="0"/>
-              <a:t>23/12/21</a:t>
+              <a:t>13/1/22</a:t>
             </a:fld>
             <a:endParaRPr lang="es-PY"/>
           </a:p>
@@ -1792,7 +1798,7 @@
           <a:p>
             <a:fld id="{E1E2DB06-679F-6849-ACCE-30C48984CE63}" type="datetimeFigureOut">
               <a:rPr lang="es-PY" smtClean="0"/>
-              <a:t>23/12/21</a:t>
+              <a:t>13/1/22</a:t>
             </a:fld>
             <a:endParaRPr lang="es-PY"/>
           </a:p>
@@ -1887,7 +1893,7 @@
           <a:p>
             <a:fld id="{E1E2DB06-679F-6849-ACCE-30C48984CE63}" type="datetimeFigureOut">
               <a:rPr lang="es-PY" smtClean="0"/>
-              <a:t>23/12/21</a:t>
+              <a:t>13/1/22</a:t>
             </a:fld>
             <a:endParaRPr lang="es-PY"/>
           </a:p>
@@ -2244,7 +2250,7 @@
           <a:p>
             <a:fld id="{E1E2DB06-679F-6849-ACCE-30C48984CE63}" type="datetimeFigureOut">
               <a:rPr lang="es-PY" smtClean="0"/>
-              <a:t>23/12/21</a:t>
+              <a:t>13/1/22</a:t>
             </a:fld>
             <a:endParaRPr lang="es-PY"/>
           </a:p>
@@ -2601,7 +2607,7 @@
           <a:p>
             <a:fld id="{E1E2DB06-679F-6849-ACCE-30C48984CE63}" type="datetimeFigureOut">
               <a:rPr lang="es-PY" smtClean="0"/>
-              <a:t>23/12/21</a:t>
+              <a:t>13/1/22</a:t>
             </a:fld>
             <a:endParaRPr lang="es-PY"/>
           </a:p>
@@ -2843,7 +2849,7 @@
           <a:p>
             <a:fld id="{E1E2DB06-679F-6849-ACCE-30C48984CE63}" type="datetimeFigureOut">
               <a:rPr lang="es-PY" smtClean="0"/>
-              <a:t>23/12/21</a:t>
+              <a:t>13/1/22</a:t>
             </a:fld>
             <a:endParaRPr lang="es-PY"/>
           </a:p>
@@ -3574,8 +3580,8 @@
         </p:nvSpPr>
         <p:spPr>
           <a:xfrm>
-            <a:off x="2401888" y="3722244"/>
-            <a:ext cx="8096250" cy="2585323"/>
+            <a:off x="1224598" y="3429000"/>
+            <a:ext cx="10273982" cy="2031325"/>
           </a:xfrm>
           <a:prstGeom prst="rect">
             <a:avLst/>
@@ -3772,6 +3778,156 @@
     <p:extLst>
       <p:ext uri="{BB962C8B-B14F-4D97-AF65-F5344CB8AC3E}">
         <p14:creationId xmlns:p14="http://schemas.microsoft.com/office/powerpoint/2010/main" val="3295537570"/>
+      </p:ext>
+    </p:extLst>
+  </p:cSld>
+  <p:clrMapOvr>
+    <a:masterClrMapping/>
+  </p:clrMapOvr>
+</p:sld>
+</file>
+
+<file path=ppt/slides/slide4.xml><?xml version="1.0" encoding="utf-8"?>
+<p:sld xmlns:a="http://schemas.openxmlformats.org/drawingml/2006/main" xmlns:r="http://schemas.openxmlformats.org/officeDocument/2006/relationships" xmlns:p="http://schemas.openxmlformats.org/presentationml/2006/main">
+  <p:cSld>
+    <p:spTree>
+      <p:nvGrpSpPr>
+        <p:cNvPr id="1" name=""/>
+        <p:cNvGrpSpPr/>
+        <p:nvPr/>
+      </p:nvGrpSpPr>
+      <p:grpSpPr>
+        <a:xfrm>
+          <a:off x="0" y="0"/>
+          <a:ext cx="0" cy="0"/>
+          <a:chOff x="0" y="0"/>
+          <a:chExt cx="0" cy="0"/>
+        </a:xfrm>
+      </p:grpSpPr>
+      <p:sp>
+        <p:nvSpPr>
+          <p:cNvPr id="2" name="Rectángulo 1">
+            <a:extLst>
+              <a:ext uri="{FF2B5EF4-FFF2-40B4-BE49-F238E27FC236}">
+                <a16:creationId xmlns:a16="http://schemas.microsoft.com/office/drawing/2014/main" id="{F32A383A-7AA8-7F4A-9138-8E7AB2E669F0}"/>
+              </a:ext>
+            </a:extLst>
+          </p:cNvPr>
+          <p:cNvSpPr/>
+          <p:nvPr/>
+        </p:nvSpPr>
+        <p:spPr>
+          <a:xfrm>
+            <a:off x="599758" y="260673"/>
+            <a:ext cx="10273982" cy="369332"/>
+          </a:xfrm>
+          <a:prstGeom prst="rect">
+            <a:avLst/>
+          </a:prstGeom>
+        </p:spPr>
+        <p:txBody>
+          <a:bodyPr wrap="square">
+            <a:spAutoFit/>
+          </a:bodyPr>
+          <a:lstStyle/>
+          <a:p>
+            <a:r>
+              <a:rPr lang="es-PY" b="1" dirty="0">
+                <a:solidFill>
+                  <a:srgbClr val="000000"/>
+                </a:solidFill>
+                <a:latin typeface="Open Sans" panose="020B0606030504020204" pitchFamily="34" charset="0"/>
+              </a:rPr>
+              <a:t>HEADER ------</a:t>
+            </a:r>
+            <a:endParaRPr lang="en-US" dirty="0"/>
+          </a:p>
+        </p:txBody>
+      </p:sp>
+      <p:sp>
+        <p:nvSpPr>
+          <p:cNvPr id="3" name="Rectángulo 2">
+            <a:extLst>
+              <a:ext uri="{FF2B5EF4-FFF2-40B4-BE49-F238E27FC236}">
+                <a16:creationId xmlns:a16="http://schemas.microsoft.com/office/drawing/2014/main" id="{20F381CD-8835-2545-B2F7-64D50F11751C}"/>
+              </a:ext>
+            </a:extLst>
+          </p:cNvPr>
+          <p:cNvSpPr/>
+          <p:nvPr/>
+        </p:nvSpPr>
+        <p:spPr>
+          <a:xfrm>
+            <a:off x="599758" y="6257926"/>
+            <a:ext cx="10273982" cy="369332"/>
+          </a:xfrm>
+          <a:prstGeom prst="rect">
+            <a:avLst/>
+          </a:prstGeom>
+        </p:spPr>
+        <p:txBody>
+          <a:bodyPr wrap="square">
+            <a:spAutoFit/>
+          </a:bodyPr>
+          <a:lstStyle/>
+          <a:p>
+            <a:r>
+              <a:rPr lang="es-PY" b="1" dirty="0">
+                <a:solidFill>
+                  <a:srgbClr val="000000"/>
+                </a:solidFill>
+                <a:latin typeface="Open Sans" panose="020B0606030504020204" pitchFamily="34" charset="0"/>
+              </a:rPr>
+              <a:t>FOOTER ------</a:t>
+            </a:r>
+            <a:endParaRPr lang="en-US" dirty="0"/>
+          </a:p>
+        </p:txBody>
+      </p:sp>
+      <p:sp>
+        <p:nvSpPr>
+          <p:cNvPr id="4" name="Rectángulo 3">
+            <a:extLst>
+              <a:ext uri="{FF2B5EF4-FFF2-40B4-BE49-F238E27FC236}">
+                <a16:creationId xmlns:a16="http://schemas.microsoft.com/office/drawing/2014/main" id="{D5F8D674-6D7C-B84E-812D-4A2D87A93166}"/>
+              </a:ext>
+            </a:extLst>
+          </p:cNvPr>
+          <p:cNvSpPr/>
+          <p:nvPr/>
+        </p:nvSpPr>
+        <p:spPr>
+          <a:xfrm>
+            <a:off x="599758" y="3244334"/>
+            <a:ext cx="10273982" cy="369332"/>
+          </a:xfrm>
+          <a:prstGeom prst="rect">
+            <a:avLst/>
+          </a:prstGeom>
+        </p:spPr>
+        <p:txBody>
+          <a:bodyPr wrap="square">
+            <a:spAutoFit/>
+          </a:bodyPr>
+          <a:lstStyle/>
+          <a:p>
+            <a:r>
+              <a:rPr lang="es-PY" b="1" dirty="0">
+                <a:solidFill>
+                  <a:srgbClr val="000000"/>
+                </a:solidFill>
+                <a:latin typeface="Open Sans" panose="020B0606030504020204" pitchFamily="34" charset="0"/>
+              </a:rPr>
+              <a:t>Testing the crop area</a:t>
+            </a:r>
+            <a:endParaRPr lang="en-US" dirty="0"/>
+          </a:p>
+        </p:txBody>
+      </p:sp>
+    </p:spTree>
+    <p:extLst>
+      <p:ext uri="{BB962C8B-B14F-4D97-AF65-F5344CB8AC3E}">
+        <p14:creationId xmlns:p14="http://schemas.microsoft.com/office/powerpoint/2010/main" val="2653103693"/>
       </p:ext>
     </p:extLst>
   </p:cSld>

</xml_diff>